<commit_message>
Included exgtra item on BOM and initial presentation file
</commit_message>
<xml_diff>
--- a/Media/incupi_logo.pptx
+++ b/Media/incupi_logo.pptx
@@ -265,7 +265,7 @@
           <a:p>
             <a:fld id="{7AED191F-6583-4C14-BE4D-3B6409A17803}" type="datetimeFigureOut">
               <a:rPr lang="en-GB" smtClean="0"/>
-              <a:t>17/01/2018</a:t>
+              <a:t>31/01/2018</a:t>
             </a:fld>
             <a:endParaRPr lang="en-GB"/>
           </a:p>
@@ -465,7 +465,7 @@
           <a:p>
             <a:fld id="{7AED191F-6583-4C14-BE4D-3B6409A17803}" type="datetimeFigureOut">
               <a:rPr lang="en-GB" smtClean="0"/>
-              <a:t>17/01/2018</a:t>
+              <a:t>31/01/2018</a:t>
             </a:fld>
             <a:endParaRPr lang="en-GB"/>
           </a:p>
@@ -675,7 +675,7 @@
           <a:p>
             <a:fld id="{7AED191F-6583-4C14-BE4D-3B6409A17803}" type="datetimeFigureOut">
               <a:rPr lang="en-GB" smtClean="0"/>
-              <a:t>17/01/2018</a:t>
+              <a:t>31/01/2018</a:t>
             </a:fld>
             <a:endParaRPr lang="en-GB"/>
           </a:p>
@@ -875,7 +875,7 @@
           <a:p>
             <a:fld id="{7AED191F-6583-4C14-BE4D-3B6409A17803}" type="datetimeFigureOut">
               <a:rPr lang="en-GB" smtClean="0"/>
-              <a:t>17/01/2018</a:t>
+              <a:t>31/01/2018</a:t>
             </a:fld>
             <a:endParaRPr lang="en-GB"/>
           </a:p>
@@ -1151,7 +1151,7 @@
           <a:p>
             <a:fld id="{7AED191F-6583-4C14-BE4D-3B6409A17803}" type="datetimeFigureOut">
               <a:rPr lang="en-GB" smtClean="0"/>
-              <a:t>17/01/2018</a:t>
+              <a:t>31/01/2018</a:t>
             </a:fld>
             <a:endParaRPr lang="en-GB"/>
           </a:p>
@@ -1419,7 +1419,7 @@
           <a:p>
             <a:fld id="{7AED191F-6583-4C14-BE4D-3B6409A17803}" type="datetimeFigureOut">
               <a:rPr lang="en-GB" smtClean="0"/>
-              <a:t>17/01/2018</a:t>
+              <a:t>31/01/2018</a:t>
             </a:fld>
             <a:endParaRPr lang="en-GB"/>
           </a:p>
@@ -1834,7 +1834,7 @@
           <a:p>
             <a:fld id="{7AED191F-6583-4C14-BE4D-3B6409A17803}" type="datetimeFigureOut">
               <a:rPr lang="en-GB" smtClean="0"/>
-              <a:t>17/01/2018</a:t>
+              <a:t>31/01/2018</a:t>
             </a:fld>
             <a:endParaRPr lang="en-GB"/>
           </a:p>
@@ -1976,7 +1976,7 @@
           <a:p>
             <a:fld id="{7AED191F-6583-4C14-BE4D-3B6409A17803}" type="datetimeFigureOut">
               <a:rPr lang="en-GB" smtClean="0"/>
-              <a:t>17/01/2018</a:t>
+              <a:t>31/01/2018</a:t>
             </a:fld>
             <a:endParaRPr lang="en-GB"/>
           </a:p>
@@ -2089,7 +2089,7 @@
           <a:p>
             <a:fld id="{7AED191F-6583-4C14-BE4D-3B6409A17803}" type="datetimeFigureOut">
               <a:rPr lang="en-GB" smtClean="0"/>
-              <a:t>17/01/2018</a:t>
+              <a:t>31/01/2018</a:t>
             </a:fld>
             <a:endParaRPr lang="en-GB"/>
           </a:p>
@@ -2402,7 +2402,7 @@
           <a:p>
             <a:fld id="{7AED191F-6583-4C14-BE4D-3B6409A17803}" type="datetimeFigureOut">
               <a:rPr lang="en-GB" smtClean="0"/>
-              <a:t>17/01/2018</a:t>
+              <a:t>31/01/2018</a:t>
             </a:fld>
             <a:endParaRPr lang="en-GB"/>
           </a:p>
@@ -2691,7 +2691,7 @@
           <a:p>
             <a:fld id="{7AED191F-6583-4C14-BE4D-3B6409A17803}" type="datetimeFigureOut">
               <a:rPr lang="en-GB" smtClean="0"/>
-              <a:t>17/01/2018</a:t>
+              <a:t>31/01/2018</a:t>
             </a:fld>
             <a:endParaRPr lang="en-GB"/>
           </a:p>
@@ -2934,7 +2934,7 @@
           <a:p>
             <a:fld id="{7AED191F-6583-4C14-BE4D-3B6409A17803}" type="datetimeFigureOut">
               <a:rPr lang="en-GB" smtClean="0"/>
-              <a:t>17/01/2018</a:t>
+              <a:t>31/01/2018</a:t>
             </a:fld>
             <a:endParaRPr lang="en-GB"/>
           </a:p>
@@ -3351,730 +3351,709 @@
           <a:chExt cx="0" cy="0"/>
         </a:xfrm>
       </p:grpSpPr>
-      <p:grpSp>
-        <p:nvGrpSpPr>
-          <p:cNvPr id="3" name="Group 2">
-            <a:extLst>
-              <a:ext uri="{FF2B5EF4-FFF2-40B4-BE49-F238E27FC236}">
-                <a16:creationId xmlns:a16="http://schemas.microsoft.com/office/drawing/2014/main" id="{7F6F602C-B10F-45FC-8285-5396D7A3CA7D}"/>
-              </a:ext>
-            </a:extLst>
-          </p:cNvPr>
-          <p:cNvGrpSpPr/>
+      <p:sp>
+        <p:nvSpPr>
+          <p:cNvPr id="7" name="Rectangle: Top Corners Rounded 6">
+            <a:extLst>
+              <a:ext uri="{FF2B5EF4-FFF2-40B4-BE49-F238E27FC236}">
+                <a16:creationId xmlns:a16="http://schemas.microsoft.com/office/drawing/2014/main" id="{7B9A01E1-8163-43B5-B558-4F159F27FE33}"/>
+              </a:ext>
+            </a:extLst>
+          </p:cNvPr>
+          <p:cNvSpPr/>
           <p:nvPr/>
-        </p:nvGrpSpPr>
-        <p:grpSpPr>
+        </p:nvSpPr>
+        <p:spPr>
           <a:xfrm>
             <a:off x="133000" y="1465262"/>
-            <a:ext cx="11811700" cy="5156590"/>
-            <a:chOff x="133000" y="1465262"/>
-            <a:chExt cx="11811700" cy="5156590"/>
+            <a:ext cx="11811700" cy="4529972"/>
           </a:xfrm>
-        </p:grpSpPr>
-        <p:sp>
-          <p:nvSpPr>
-            <p:cNvPr id="7" name="Rectangle: Top Corners Rounded 6">
-              <a:extLst>
-                <a:ext uri="{FF2B5EF4-FFF2-40B4-BE49-F238E27FC236}">
-                  <a16:creationId xmlns:a16="http://schemas.microsoft.com/office/drawing/2014/main" id="{7B9A01E1-8163-43B5-B558-4F159F27FE33}"/>
-                </a:ext>
-              </a:extLst>
-            </p:cNvPr>
-            <p:cNvSpPr/>
-            <p:nvPr/>
-          </p:nvSpPr>
-          <p:spPr>
-            <a:xfrm>
-              <a:off x="133000" y="1465262"/>
-              <a:ext cx="11811700" cy="4529972"/>
-            </a:xfrm>
-            <a:prstGeom prst="round2SameRect">
-              <a:avLst/>
-            </a:prstGeom>
+          <a:prstGeom prst="round2SameRect">
+            <a:avLst/>
+          </a:prstGeom>
+          <a:solidFill>
+            <a:schemeClr val="accent1">
+              <a:lumMod val="20000"/>
+              <a:lumOff val="80000"/>
+            </a:schemeClr>
+          </a:solidFill>
+          <a:ln>
+            <a:noFill/>
+          </a:ln>
+        </p:spPr>
+        <p:style>
+          <a:lnRef idx="2">
+            <a:schemeClr val="accent1">
+              <a:shade val="50000"/>
+            </a:schemeClr>
+          </a:lnRef>
+          <a:fillRef idx="1">
+            <a:schemeClr val="accent1"/>
+          </a:fillRef>
+          <a:effectRef idx="0">
+            <a:schemeClr val="accent1"/>
+          </a:effectRef>
+          <a:fontRef idx="minor">
+            <a:schemeClr val="lt1"/>
+          </a:fontRef>
+        </p:style>
+        <p:txBody>
+          <a:bodyPr rtlCol="0" anchor="ctr"/>
+          <a:lstStyle/>
+          <a:p>
+            <a:pPr algn="ctr"/>
+            <a:endParaRPr lang="en-GB"/>
+          </a:p>
+        </p:txBody>
+      </p:sp>
+      <p:sp>
+        <p:nvSpPr>
+          <p:cNvPr id="4" name="TextBox 3">
+            <a:extLst>
+              <a:ext uri="{FF2B5EF4-FFF2-40B4-BE49-F238E27FC236}">
+                <a16:creationId xmlns:a16="http://schemas.microsoft.com/office/drawing/2014/main" id="{171257CA-3933-41D5-88D3-D171F90C03D8}"/>
+              </a:ext>
+            </a:extLst>
+          </p:cNvPr>
+          <p:cNvSpPr txBox="1"/>
+          <p:nvPr/>
+        </p:nvSpPr>
+        <p:spPr>
+          <a:xfrm>
+            <a:off x="2451982" y="2112924"/>
+            <a:ext cx="9429139" cy="4508928"/>
+          </a:xfrm>
+          <a:prstGeom prst="rect">
+            <a:avLst/>
+          </a:prstGeom>
+          <a:noFill/>
+        </p:spPr>
+        <p:txBody>
+          <a:bodyPr wrap="square" rtlCol="0">
+            <a:spAutoFit/>
+          </a:bodyPr>
+          <a:lstStyle/>
+          <a:p>
+            <a:r>
+              <a:rPr lang="en-GB" sz="28700" dirty="0"/>
+              <a:t>Incu</a:t>
+            </a:r>
+            <a:r>
+              <a:rPr lang="en-GB" sz="28700" dirty="0">
+                <a:solidFill>
+                  <a:srgbClr val="D23286"/>
+                </a:solidFill>
+              </a:rPr>
+              <a:t>Pi</a:t>
+            </a:r>
+          </a:p>
+        </p:txBody>
+      </p:sp>
+      <p:sp>
+        <p:nvSpPr>
+          <p:cNvPr id="8" name="Oval 7">
+            <a:extLst>
+              <a:ext uri="{FF2B5EF4-FFF2-40B4-BE49-F238E27FC236}">
+                <a16:creationId xmlns:a16="http://schemas.microsoft.com/office/drawing/2014/main" id="{E6BE841E-1760-4DA3-895A-975D1F731B1F}"/>
+              </a:ext>
+            </a:extLst>
+          </p:cNvPr>
+          <p:cNvSpPr/>
+          <p:nvPr/>
+        </p:nvSpPr>
+        <p:spPr>
+          <a:xfrm>
+            <a:off x="770278" y="2208192"/>
+            <a:ext cx="1567295" cy="1696106"/>
+          </a:xfrm>
+          <a:prstGeom prst="ellipse">
+            <a:avLst/>
+          </a:prstGeom>
+          <a:noFill/>
+          <a:ln w="28575">
             <a:solidFill>
-              <a:schemeClr val="accent1">
-                <a:lumMod val="20000"/>
-                <a:lumOff val="80000"/>
+              <a:schemeClr val="tx1">
+                <a:lumMod val="65000"/>
+                <a:lumOff val="35000"/>
               </a:schemeClr>
             </a:solidFill>
-            <a:ln>
-              <a:noFill/>
-            </a:ln>
-          </p:spPr>
-          <p:style>
-            <a:lnRef idx="2">
-              <a:schemeClr val="accent1">
-                <a:shade val="50000"/>
-              </a:schemeClr>
-            </a:lnRef>
-            <a:fillRef idx="1">
-              <a:schemeClr val="accent1"/>
-            </a:fillRef>
-            <a:effectRef idx="0">
-              <a:schemeClr val="accent1"/>
-            </a:effectRef>
-            <a:fontRef idx="minor">
-              <a:schemeClr val="lt1"/>
-            </a:fontRef>
-          </p:style>
-          <p:txBody>
-            <a:bodyPr rtlCol="0" anchor="ctr"/>
-            <a:lstStyle/>
-            <a:p>
-              <a:pPr algn="ctr"/>
-              <a:endParaRPr lang="en-GB"/>
-            </a:p>
-          </p:txBody>
-        </p:sp>
-        <p:sp>
-          <p:nvSpPr>
-            <p:cNvPr id="4" name="TextBox 3">
-              <a:extLst>
-                <a:ext uri="{FF2B5EF4-FFF2-40B4-BE49-F238E27FC236}">
-                  <a16:creationId xmlns:a16="http://schemas.microsoft.com/office/drawing/2014/main" id="{171257CA-3933-41D5-88D3-D171F90C03D8}"/>
-                </a:ext>
-              </a:extLst>
-            </p:cNvPr>
-            <p:cNvSpPr txBox="1"/>
-            <p:nvPr/>
-          </p:nvSpPr>
-          <p:spPr>
-            <a:xfrm>
-              <a:off x="2451982" y="2112924"/>
-              <a:ext cx="9429139" cy="4508928"/>
-            </a:xfrm>
-            <a:prstGeom prst="rect">
-              <a:avLst/>
-            </a:prstGeom>
-            <a:noFill/>
-          </p:spPr>
-          <p:txBody>
-            <a:bodyPr wrap="square" rtlCol="0">
-              <a:spAutoFit/>
-            </a:bodyPr>
-            <a:lstStyle/>
-            <a:p>
-              <a:r>
-                <a:rPr lang="en-GB" sz="28700" dirty="0"/>
-                <a:t>Incu</a:t>
-              </a:r>
-              <a:r>
-                <a:rPr lang="en-GB" sz="28700" dirty="0">
-                  <a:solidFill>
-                    <a:srgbClr val="D23286"/>
-                  </a:solidFill>
-                </a:rPr>
-                <a:t>Pi</a:t>
-              </a:r>
-            </a:p>
-          </p:txBody>
-        </p:sp>
-        <p:sp>
-          <p:nvSpPr>
-            <p:cNvPr id="8" name="Oval 7">
-              <a:extLst>
-                <a:ext uri="{FF2B5EF4-FFF2-40B4-BE49-F238E27FC236}">
-                  <a16:creationId xmlns:a16="http://schemas.microsoft.com/office/drawing/2014/main" id="{E6BE841E-1760-4DA3-895A-975D1F731B1F}"/>
-                </a:ext>
-              </a:extLst>
-            </p:cNvPr>
-            <p:cNvSpPr/>
-            <p:nvPr/>
-          </p:nvSpPr>
-          <p:spPr>
-            <a:xfrm>
-              <a:off x="770278" y="2208192"/>
-              <a:ext cx="1567295" cy="1696106"/>
-            </a:xfrm>
-            <a:prstGeom prst="ellipse">
-              <a:avLst/>
-            </a:prstGeom>
-            <a:noFill/>
-            <a:ln w="28575">
-              <a:solidFill>
-                <a:schemeClr val="tx1">
-                  <a:lumMod val="65000"/>
-                  <a:lumOff val="35000"/>
-                </a:schemeClr>
-              </a:solidFill>
-            </a:ln>
-          </p:spPr>
-          <p:style>
-            <a:lnRef idx="2">
-              <a:schemeClr val="accent1">
-                <a:shade val="50000"/>
-              </a:schemeClr>
-            </a:lnRef>
-            <a:fillRef idx="1">
-              <a:schemeClr val="accent1"/>
-            </a:fillRef>
-            <a:effectRef idx="0">
-              <a:schemeClr val="accent1"/>
-            </a:effectRef>
-            <a:fontRef idx="minor">
-              <a:schemeClr val="lt1"/>
-            </a:fontRef>
-          </p:style>
-          <p:txBody>
-            <a:bodyPr rtlCol="0" anchor="ctr"/>
-            <a:lstStyle/>
-            <a:p>
-              <a:pPr algn="ctr"/>
-              <a:endParaRPr lang="en-GB"/>
-            </a:p>
-          </p:txBody>
-        </p:sp>
-        <p:sp>
-          <p:nvSpPr>
-            <p:cNvPr id="13" name="Arc 12">
-              <a:extLst>
-                <a:ext uri="{FF2B5EF4-FFF2-40B4-BE49-F238E27FC236}">
-                  <a16:creationId xmlns:a16="http://schemas.microsoft.com/office/drawing/2014/main" id="{D9615435-9CAE-414D-9EC0-DE88CAE5B850}"/>
-                </a:ext>
-              </a:extLst>
-            </p:cNvPr>
-            <p:cNvSpPr/>
-            <p:nvPr/>
-          </p:nvSpPr>
-          <p:spPr>
-            <a:xfrm rot="7868174">
-              <a:off x="1322999" y="3083752"/>
-              <a:ext cx="436025" cy="467831"/>
-            </a:xfrm>
-            <a:prstGeom prst="arc">
-              <a:avLst/>
-            </a:prstGeom>
-            <a:ln w="28575">
-              <a:solidFill>
-                <a:schemeClr val="tx1">
-                  <a:lumMod val="65000"/>
-                  <a:lumOff val="35000"/>
-                </a:schemeClr>
-              </a:solidFill>
-            </a:ln>
-          </p:spPr>
-          <p:style>
-            <a:lnRef idx="1">
-              <a:schemeClr val="accent1"/>
-            </a:lnRef>
-            <a:fillRef idx="0">
-              <a:schemeClr val="accent1"/>
-            </a:fillRef>
-            <a:effectRef idx="0">
-              <a:schemeClr val="accent1"/>
-            </a:effectRef>
-            <a:fontRef idx="minor">
-              <a:schemeClr val="tx1"/>
-            </a:fontRef>
-          </p:style>
-          <p:txBody>
-            <a:bodyPr rtlCol="0" anchor="ctr"/>
-            <a:lstStyle/>
-            <a:p>
-              <a:pPr algn="ctr"/>
-              <a:endParaRPr lang="en-GB"/>
-            </a:p>
-          </p:txBody>
-        </p:sp>
-        <p:sp>
-          <p:nvSpPr>
-            <p:cNvPr id="14" name="Freeform: Shape 13">
-              <a:extLst>
-                <a:ext uri="{FF2B5EF4-FFF2-40B4-BE49-F238E27FC236}">
-                  <a16:creationId xmlns:a16="http://schemas.microsoft.com/office/drawing/2014/main" id="{0DA1C1E6-E82E-47E3-8EF9-AB32D4B62429}"/>
-                </a:ext>
-              </a:extLst>
-            </p:cNvPr>
-            <p:cNvSpPr/>
-            <p:nvPr/>
-          </p:nvSpPr>
-          <p:spPr>
-            <a:xfrm>
-              <a:off x="1454603" y="2208176"/>
-              <a:ext cx="198643" cy="344448"/>
-            </a:xfrm>
-            <a:custGeom>
-              <a:avLst/>
-              <a:gdLst>
-                <a:gd name="connsiteX0" fmla="*/ 60700 w 86717"/>
-                <a:gd name="connsiteY0" fmla="*/ 0 h 200025"/>
-                <a:gd name="connsiteX1" fmla="*/ 375 w 86717"/>
-                <a:gd name="connsiteY1" fmla="*/ 57150 h 200025"/>
-                <a:gd name="connsiteX2" fmla="*/ 86100 w 86717"/>
-                <a:gd name="connsiteY2" fmla="*/ 136525 h 200025"/>
-                <a:gd name="connsiteX3" fmla="*/ 32125 w 86717"/>
-                <a:gd name="connsiteY3" fmla="*/ 200025 h 200025"/>
-              </a:gdLst>
-              <a:ahLst/>
-              <a:cxnLst>
-                <a:cxn ang="0">
-                  <a:pos x="connsiteX0" y="connsiteY0"/>
-                </a:cxn>
-                <a:cxn ang="0">
-                  <a:pos x="connsiteX1" y="connsiteY1"/>
-                </a:cxn>
-                <a:cxn ang="0">
-                  <a:pos x="connsiteX2" y="connsiteY2"/>
-                </a:cxn>
-                <a:cxn ang="0">
-                  <a:pos x="connsiteX3" y="connsiteY3"/>
-                </a:cxn>
-              </a:cxnLst>
-              <a:rect l="l" t="t" r="r" b="b"/>
-              <a:pathLst>
-                <a:path w="86717" h="200025">
-                  <a:moveTo>
-                    <a:pt x="60700" y="0"/>
-                  </a:moveTo>
-                  <a:cubicBezTo>
-                    <a:pt x="28421" y="17198"/>
-                    <a:pt x="-3858" y="34396"/>
-                    <a:pt x="375" y="57150"/>
-                  </a:cubicBezTo>
-                  <a:cubicBezTo>
-                    <a:pt x="4608" y="79904"/>
-                    <a:pt x="80808" y="112712"/>
-                    <a:pt x="86100" y="136525"/>
-                  </a:cubicBezTo>
-                  <a:cubicBezTo>
-                    <a:pt x="91392" y="160338"/>
-                    <a:pt x="61758" y="180181"/>
-                    <a:pt x="32125" y="200025"/>
-                  </a:cubicBezTo>
-                </a:path>
-              </a:pathLst>
-            </a:custGeom>
-            <a:noFill/>
-            <a:ln w="28575">
-              <a:solidFill>
-                <a:schemeClr val="tx1">
-                  <a:lumMod val="65000"/>
-                  <a:lumOff val="35000"/>
-                </a:schemeClr>
-              </a:solidFill>
-            </a:ln>
-          </p:spPr>
-          <p:style>
-            <a:lnRef idx="2">
-              <a:schemeClr val="accent1">
-                <a:shade val="50000"/>
-              </a:schemeClr>
-            </a:lnRef>
-            <a:fillRef idx="1">
-              <a:schemeClr val="accent1"/>
-            </a:fillRef>
-            <a:effectRef idx="0">
-              <a:schemeClr val="accent1"/>
-            </a:effectRef>
-            <a:fontRef idx="minor">
-              <a:schemeClr val="lt1"/>
-            </a:fontRef>
-          </p:style>
-          <p:txBody>
-            <a:bodyPr rtlCol="0" anchor="ctr"/>
-            <a:lstStyle/>
-            <a:p>
-              <a:pPr algn="ctr"/>
-              <a:endParaRPr lang="en-GB"/>
-            </a:p>
-          </p:txBody>
-        </p:sp>
-        <p:sp>
-          <p:nvSpPr>
-            <p:cNvPr id="17" name="Flowchart: Stored Data 16">
-              <a:extLst>
-                <a:ext uri="{FF2B5EF4-FFF2-40B4-BE49-F238E27FC236}">
-                  <a16:creationId xmlns:a16="http://schemas.microsoft.com/office/drawing/2014/main" id="{59393107-E24C-4BAB-A6D6-7C73CF129333}"/>
-                </a:ext>
-              </a:extLst>
-            </p:cNvPr>
-            <p:cNvSpPr/>
-            <p:nvPr/>
-          </p:nvSpPr>
-          <p:spPr>
-            <a:xfrm rot="16200000">
-              <a:off x="398429" y="3693300"/>
-              <a:ext cx="2307835" cy="1564137"/>
-            </a:xfrm>
-            <a:prstGeom prst="flowChartOnlineStorage">
-              <a:avLst/>
-            </a:prstGeom>
+          </a:ln>
+        </p:spPr>
+        <p:style>
+          <a:lnRef idx="2">
+            <a:schemeClr val="accent1">
+              <a:shade val="50000"/>
+            </a:schemeClr>
+          </a:lnRef>
+          <a:fillRef idx="1">
+            <a:schemeClr val="accent1"/>
+          </a:fillRef>
+          <a:effectRef idx="0">
+            <a:schemeClr val="accent1"/>
+          </a:effectRef>
+          <a:fontRef idx="minor">
+            <a:schemeClr val="lt1"/>
+          </a:fontRef>
+        </p:style>
+        <p:txBody>
+          <a:bodyPr rtlCol="0" anchor="ctr"/>
+          <a:lstStyle/>
+          <a:p>
+            <a:pPr algn="ctr"/>
+            <a:endParaRPr lang="en-GB"/>
+          </a:p>
+        </p:txBody>
+      </p:sp>
+      <p:sp>
+        <p:nvSpPr>
+          <p:cNvPr id="13" name="Arc 12">
+            <a:extLst>
+              <a:ext uri="{FF2B5EF4-FFF2-40B4-BE49-F238E27FC236}">
+                <a16:creationId xmlns:a16="http://schemas.microsoft.com/office/drawing/2014/main" id="{D9615435-9CAE-414D-9EC0-DE88CAE5B850}"/>
+              </a:ext>
+            </a:extLst>
+          </p:cNvPr>
+          <p:cNvSpPr/>
+          <p:nvPr/>
+        </p:nvSpPr>
+        <p:spPr>
+          <a:xfrm rot="7868174">
+            <a:off x="1322999" y="3083752"/>
+            <a:ext cx="436025" cy="467831"/>
+          </a:xfrm>
+          <a:prstGeom prst="arc">
+            <a:avLst/>
+          </a:prstGeom>
+          <a:ln w="28575">
             <a:solidFill>
-              <a:schemeClr val="accent1">
-                <a:lumMod val="40000"/>
-                <a:lumOff val="60000"/>
+              <a:schemeClr val="tx1">
+                <a:lumMod val="65000"/>
+                <a:lumOff val="35000"/>
               </a:schemeClr>
             </a:solidFill>
-            <a:ln w="28575">
-              <a:solidFill>
-                <a:schemeClr val="tx1">
-                  <a:lumMod val="65000"/>
-                  <a:lumOff val="35000"/>
-                </a:schemeClr>
-              </a:solidFill>
-            </a:ln>
-          </p:spPr>
-          <p:style>
-            <a:lnRef idx="2">
-              <a:schemeClr val="accent1">
-                <a:shade val="50000"/>
-              </a:schemeClr>
-            </a:lnRef>
-            <a:fillRef idx="1">
-              <a:schemeClr val="accent1"/>
-            </a:fillRef>
-            <a:effectRef idx="0">
-              <a:schemeClr val="accent1"/>
-            </a:effectRef>
-            <a:fontRef idx="minor">
-              <a:schemeClr val="lt1"/>
-            </a:fontRef>
-          </p:style>
-          <p:txBody>
-            <a:bodyPr rtlCol="0" anchor="ctr"/>
-            <a:lstStyle/>
-            <a:p>
-              <a:pPr algn="ctr"/>
-              <a:endParaRPr lang="en-GB" dirty="0"/>
-            </a:p>
-          </p:txBody>
-        </p:sp>
-        <p:sp>
-          <p:nvSpPr>
-            <p:cNvPr id="22" name="Freeform: Shape 21">
-              <a:extLst>
-                <a:ext uri="{FF2B5EF4-FFF2-40B4-BE49-F238E27FC236}">
-                  <a16:creationId xmlns:a16="http://schemas.microsoft.com/office/drawing/2014/main" id="{97337FE2-0F17-4E81-90C4-DA3E53232EBD}"/>
-                </a:ext>
-              </a:extLst>
-            </p:cNvPr>
-            <p:cNvSpPr/>
-            <p:nvPr/>
-          </p:nvSpPr>
-          <p:spPr>
-            <a:xfrm rot="8762289">
-              <a:off x="1390805" y="4451208"/>
-              <a:ext cx="1244215" cy="1018574"/>
-            </a:xfrm>
-            <a:custGeom>
-              <a:avLst/>
-              <a:gdLst>
-                <a:gd name="connsiteX0" fmla="*/ 329155 w 627002"/>
-                <a:gd name="connsiteY0" fmla="*/ 0 h 411255"/>
-                <a:gd name="connsiteX1" fmla="*/ 624430 w 627002"/>
-                <a:gd name="connsiteY1" fmla="*/ 266700 h 411255"/>
-                <a:gd name="connsiteX2" fmla="*/ 448217 w 627002"/>
-                <a:gd name="connsiteY2" fmla="*/ 407194 h 411255"/>
-                <a:gd name="connsiteX3" fmla="*/ 38642 w 627002"/>
-                <a:gd name="connsiteY3" fmla="*/ 376238 h 411255"/>
-                <a:gd name="connsiteX4" fmla="*/ 41023 w 627002"/>
-                <a:gd name="connsiteY4" fmla="*/ 373857 h 411255"/>
-              </a:gdLst>
-              <a:ahLst/>
-              <a:cxnLst>
-                <a:cxn ang="0">
-                  <a:pos x="connsiteX0" y="connsiteY0"/>
-                </a:cxn>
-                <a:cxn ang="0">
-                  <a:pos x="connsiteX1" y="connsiteY1"/>
-                </a:cxn>
-                <a:cxn ang="0">
-                  <a:pos x="connsiteX2" y="connsiteY2"/>
-                </a:cxn>
-                <a:cxn ang="0">
-                  <a:pos x="connsiteX3" y="connsiteY3"/>
-                </a:cxn>
-                <a:cxn ang="0">
-                  <a:pos x="connsiteX4" y="connsiteY4"/>
-                </a:cxn>
-              </a:cxnLst>
-              <a:rect l="l" t="t" r="r" b="b"/>
-              <a:pathLst>
-                <a:path w="627002" h="411255">
-                  <a:moveTo>
-                    <a:pt x="329155" y="0"/>
-                  </a:moveTo>
-                  <a:cubicBezTo>
-                    <a:pt x="466870" y="99417"/>
-                    <a:pt x="604586" y="198834"/>
-                    <a:pt x="624430" y="266700"/>
-                  </a:cubicBezTo>
-                  <a:cubicBezTo>
-                    <a:pt x="644274" y="334566"/>
-                    <a:pt x="545848" y="388938"/>
-                    <a:pt x="448217" y="407194"/>
-                  </a:cubicBezTo>
-                  <a:cubicBezTo>
-                    <a:pt x="350586" y="425450"/>
-                    <a:pt x="38642" y="376238"/>
-                    <a:pt x="38642" y="376238"/>
-                  </a:cubicBezTo>
-                  <a:cubicBezTo>
-                    <a:pt x="-29224" y="370682"/>
-                    <a:pt x="5899" y="372269"/>
-                    <a:pt x="41023" y="373857"/>
-                  </a:cubicBezTo>
-                </a:path>
-              </a:pathLst>
-            </a:custGeom>
-            <a:noFill/>
-            <a:ln w="28575">
-              <a:solidFill>
-                <a:schemeClr val="tx1">
-                  <a:lumMod val="65000"/>
-                  <a:lumOff val="35000"/>
-                </a:schemeClr>
-              </a:solidFill>
-            </a:ln>
-          </p:spPr>
-          <p:style>
-            <a:lnRef idx="2">
-              <a:schemeClr val="accent1">
-                <a:shade val="50000"/>
-              </a:schemeClr>
-            </a:lnRef>
-            <a:fillRef idx="1">
-              <a:schemeClr val="accent1"/>
-            </a:fillRef>
-            <a:effectRef idx="0">
-              <a:schemeClr val="accent1"/>
-            </a:effectRef>
-            <a:fontRef idx="minor">
-              <a:schemeClr val="lt1"/>
-            </a:fontRef>
-          </p:style>
-          <p:txBody>
-            <a:bodyPr rtlCol="0" anchor="ctr"/>
-            <a:lstStyle/>
-            <a:p>
-              <a:pPr algn="ctr"/>
-              <a:endParaRPr lang="en-GB"/>
-            </a:p>
-          </p:txBody>
-        </p:sp>
-        <p:sp>
-          <p:nvSpPr>
-            <p:cNvPr id="5" name="Freeform: Shape 4">
-              <a:extLst>
-                <a:ext uri="{FF2B5EF4-FFF2-40B4-BE49-F238E27FC236}">
-                  <a16:creationId xmlns:a16="http://schemas.microsoft.com/office/drawing/2014/main" id="{6D85E96A-3B46-421B-BADA-FEC538A31278}"/>
-                </a:ext>
-              </a:extLst>
-            </p:cNvPr>
-            <p:cNvSpPr/>
-            <p:nvPr/>
-          </p:nvSpPr>
-          <p:spPr>
-            <a:xfrm>
-              <a:off x="776213" y="3730248"/>
-              <a:ext cx="1244215" cy="1018574"/>
-            </a:xfrm>
-            <a:custGeom>
-              <a:avLst/>
-              <a:gdLst>
-                <a:gd name="connsiteX0" fmla="*/ 329155 w 627002"/>
-                <a:gd name="connsiteY0" fmla="*/ 0 h 411255"/>
-                <a:gd name="connsiteX1" fmla="*/ 624430 w 627002"/>
-                <a:gd name="connsiteY1" fmla="*/ 266700 h 411255"/>
-                <a:gd name="connsiteX2" fmla="*/ 448217 w 627002"/>
-                <a:gd name="connsiteY2" fmla="*/ 407194 h 411255"/>
-                <a:gd name="connsiteX3" fmla="*/ 38642 w 627002"/>
-                <a:gd name="connsiteY3" fmla="*/ 376238 h 411255"/>
-                <a:gd name="connsiteX4" fmla="*/ 41023 w 627002"/>
-                <a:gd name="connsiteY4" fmla="*/ 373857 h 411255"/>
-              </a:gdLst>
-              <a:ahLst/>
-              <a:cxnLst>
-                <a:cxn ang="0">
-                  <a:pos x="connsiteX0" y="connsiteY0"/>
-                </a:cxn>
-                <a:cxn ang="0">
-                  <a:pos x="connsiteX1" y="connsiteY1"/>
-                </a:cxn>
-                <a:cxn ang="0">
-                  <a:pos x="connsiteX2" y="connsiteY2"/>
-                </a:cxn>
-                <a:cxn ang="0">
-                  <a:pos x="connsiteX3" y="connsiteY3"/>
-                </a:cxn>
-                <a:cxn ang="0">
-                  <a:pos x="connsiteX4" y="connsiteY4"/>
-                </a:cxn>
-              </a:cxnLst>
-              <a:rect l="l" t="t" r="r" b="b"/>
-              <a:pathLst>
-                <a:path w="627002" h="411255">
-                  <a:moveTo>
-                    <a:pt x="329155" y="0"/>
-                  </a:moveTo>
-                  <a:cubicBezTo>
-                    <a:pt x="466870" y="99417"/>
-                    <a:pt x="604586" y="198834"/>
-                    <a:pt x="624430" y="266700"/>
-                  </a:cubicBezTo>
-                  <a:cubicBezTo>
-                    <a:pt x="644274" y="334566"/>
-                    <a:pt x="545848" y="388938"/>
-                    <a:pt x="448217" y="407194"/>
-                  </a:cubicBezTo>
-                  <a:cubicBezTo>
-                    <a:pt x="350586" y="425450"/>
-                    <a:pt x="38642" y="376238"/>
-                    <a:pt x="38642" y="376238"/>
-                  </a:cubicBezTo>
-                  <a:cubicBezTo>
-                    <a:pt x="-29224" y="370682"/>
-                    <a:pt x="5899" y="372269"/>
-                    <a:pt x="41023" y="373857"/>
-                  </a:cubicBezTo>
-                </a:path>
-              </a:pathLst>
-            </a:custGeom>
+          </a:ln>
+        </p:spPr>
+        <p:style>
+          <a:lnRef idx="1">
+            <a:schemeClr val="accent1"/>
+          </a:lnRef>
+          <a:fillRef idx="0">
+            <a:schemeClr val="accent1"/>
+          </a:fillRef>
+          <a:effectRef idx="0">
+            <a:schemeClr val="accent1"/>
+          </a:effectRef>
+          <a:fontRef idx="minor">
+            <a:schemeClr val="tx1"/>
+          </a:fontRef>
+        </p:style>
+        <p:txBody>
+          <a:bodyPr rtlCol="0" anchor="ctr"/>
+          <a:lstStyle/>
+          <a:p>
+            <a:pPr algn="ctr"/>
+            <a:endParaRPr lang="en-GB"/>
+          </a:p>
+        </p:txBody>
+      </p:sp>
+      <p:sp>
+        <p:nvSpPr>
+          <p:cNvPr id="14" name="Freeform: Shape 13">
+            <a:extLst>
+              <a:ext uri="{FF2B5EF4-FFF2-40B4-BE49-F238E27FC236}">
+                <a16:creationId xmlns:a16="http://schemas.microsoft.com/office/drawing/2014/main" id="{0DA1C1E6-E82E-47E3-8EF9-AB32D4B62429}"/>
+              </a:ext>
+            </a:extLst>
+          </p:cNvPr>
+          <p:cNvSpPr/>
+          <p:nvPr/>
+        </p:nvSpPr>
+        <p:spPr>
+          <a:xfrm>
+            <a:off x="1454603" y="2208176"/>
+            <a:ext cx="198643" cy="344448"/>
+          </a:xfrm>
+          <a:custGeom>
+            <a:avLst/>
+            <a:gdLst>
+              <a:gd name="connsiteX0" fmla="*/ 60700 w 86717"/>
+              <a:gd name="connsiteY0" fmla="*/ 0 h 200025"/>
+              <a:gd name="connsiteX1" fmla="*/ 375 w 86717"/>
+              <a:gd name="connsiteY1" fmla="*/ 57150 h 200025"/>
+              <a:gd name="connsiteX2" fmla="*/ 86100 w 86717"/>
+              <a:gd name="connsiteY2" fmla="*/ 136525 h 200025"/>
+              <a:gd name="connsiteX3" fmla="*/ 32125 w 86717"/>
+              <a:gd name="connsiteY3" fmla="*/ 200025 h 200025"/>
+            </a:gdLst>
+            <a:ahLst/>
+            <a:cxnLst>
+              <a:cxn ang="0">
+                <a:pos x="connsiteX0" y="connsiteY0"/>
+              </a:cxn>
+              <a:cxn ang="0">
+                <a:pos x="connsiteX1" y="connsiteY1"/>
+              </a:cxn>
+              <a:cxn ang="0">
+                <a:pos x="connsiteX2" y="connsiteY2"/>
+              </a:cxn>
+              <a:cxn ang="0">
+                <a:pos x="connsiteX3" y="connsiteY3"/>
+              </a:cxn>
+            </a:cxnLst>
+            <a:rect l="l" t="t" r="r" b="b"/>
+            <a:pathLst>
+              <a:path w="86717" h="200025">
+                <a:moveTo>
+                  <a:pt x="60700" y="0"/>
+                </a:moveTo>
+                <a:cubicBezTo>
+                  <a:pt x="28421" y="17198"/>
+                  <a:pt x="-3858" y="34396"/>
+                  <a:pt x="375" y="57150"/>
+                </a:cubicBezTo>
+                <a:cubicBezTo>
+                  <a:pt x="4608" y="79904"/>
+                  <a:pt x="80808" y="112712"/>
+                  <a:pt x="86100" y="136525"/>
+                </a:cubicBezTo>
+                <a:cubicBezTo>
+                  <a:pt x="91392" y="160338"/>
+                  <a:pt x="61758" y="180181"/>
+                  <a:pt x="32125" y="200025"/>
+                </a:cubicBezTo>
+              </a:path>
+            </a:pathLst>
+          </a:custGeom>
+          <a:noFill/>
+          <a:ln w="28575">
             <a:solidFill>
-              <a:schemeClr val="accent1">
-                <a:lumMod val="40000"/>
-                <a:lumOff val="60000"/>
+              <a:schemeClr val="tx1">
+                <a:lumMod val="65000"/>
+                <a:lumOff val="35000"/>
               </a:schemeClr>
             </a:solidFill>
-            <a:ln w="28575">
-              <a:solidFill>
-                <a:schemeClr val="tx1">
-                  <a:lumMod val="65000"/>
-                  <a:lumOff val="35000"/>
-                </a:schemeClr>
-              </a:solidFill>
-            </a:ln>
-          </p:spPr>
-          <p:style>
-            <a:lnRef idx="2">
-              <a:schemeClr val="accent1">
-                <a:shade val="50000"/>
+          </a:ln>
+        </p:spPr>
+        <p:style>
+          <a:lnRef idx="2">
+            <a:schemeClr val="accent1">
+              <a:shade val="50000"/>
+            </a:schemeClr>
+          </a:lnRef>
+          <a:fillRef idx="1">
+            <a:schemeClr val="accent1"/>
+          </a:fillRef>
+          <a:effectRef idx="0">
+            <a:schemeClr val="accent1"/>
+          </a:effectRef>
+          <a:fontRef idx="minor">
+            <a:schemeClr val="lt1"/>
+          </a:fontRef>
+        </p:style>
+        <p:txBody>
+          <a:bodyPr rtlCol="0" anchor="ctr"/>
+          <a:lstStyle/>
+          <a:p>
+            <a:pPr algn="ctr"/>
+            <a:endParaRPr lang="en-GB"/>
+          </a:p>
+        </p:txBody>
+      </p:sp>
+      <p:sp>
+        <p:nvSpPr>
+          <p:cNvPr id="17" name="Flowchart: Stored Data 16">
+            <a:extLst>
+              <a:ext uri="{FF2B5EF4-FFF2-40B4-BE49-F238E27FC236}">
+                <a16:creationId xmlns:a16="http://schemas.microsoft.com/office/drawing/2014/main" id="{59393107-E24C-4BAB-A6D6-7C73CF129333}"/>
+              </a:ext>
+            </a:extLst>
+          </p:cNvPr>
+          <p:cNvSpPr/>
+          <p:nvPr/>
+        </p:nvSpPr>
+        <p:spPr>
+          <a:xfrm rot="16200000">
+            <a:off x="398429" y="3693300"/>
+            <a:ext cx="2307835" cy="1564137"/>
+          </a:xfrm>
+          <a:prstGeom prst="flowChartOnlineStorage">
+            <a:avLst/>
+          </a:prstGeom>
+          <a:solidFill>
+            <a:schemeClr val="accent1">
+              <a:lumMod val="40000"/>
+              <a:lumOff val="60000"/>
+            </a:schemeClr>
+          </a:solidFill>
+          <a:ln w="28575">
+            <a:solidFill>
+              <a:schemeClr val="tx1">
+                <a:lumMod val="65000"/>
+                <a:lumOff val="35000"/>
               </a:schemeClr>
-            </a:lnRef>
-            <a:fillRef idx="1">
-              <a:schemeClr val="accent1"/>
-            </a:fillRef>
-            <a:effectRef idx="0">
-              <a:schemeClr val="accent1"/>
-            </a:effectRef>
-            <a:fontRef idx="minor">
-              <a:schemeClr val="lt1"/>
-            </a:fontRef>
-          </p:style>
-          <p:txBody>
-            <a:bodyPr rtlCol="0" anchor="ctr"/>
-            <a:lstStyle/>
-            <a:p>
-              <a:pPr algn="ctr"/>
-              <a:endParaRPr lang="en-GB"/>
-            </a:p>
-          </p:txBody>
-        </p:sp>
-        <p:sp>
-          <p:nvSpPr>
-            <p:cNvPr id="23" name="Arc 22">
-              <a:extLst>
-                <a:ext uri="{FF2B5EF4-FFF2-40B4-BE49-F238E27FC236}">
-                  <a16:creationId xmlns:a16="http://schemas.microsoft.com/office/drawing/2014/main" id="{4D817DBB-903E-4EBB-A2A5-E895FF8220F7}"/>
-                </a:ext>
-              </a:extLst>
-            </p:cNvPr>
-            <p:cNvSpPr/>
-            <p:nvPr/>
-          </p:nvSpPr>
-          <p:spPr>
-            <a:xfrm rot="8208340">
-              <a:off x="1137790" y="2854205"/>
-              <a:ext cx="292420" cy="297865"/>
-            </a:xfrm>
-            <a:prstGeom prst="arc">
-              <a:avLst/>
-            </a:prstGeom>
-            <a:ln w="28575">
-              <a:solidFill>
-                <a:schemeClr val="tx1">
-                  <a:lumMod val="65000"/>
-                  <a:lumOff val="35000"/>
-                </a:schemeClr>
-              </a:solidFill>
-            </a:ln>
-          </p:spPr>
-          <p:style>
-            <a:lnRef idx="1">
-              <a:schemeClr val="accent1"/>
-            </a:lnRef>
-            <a:fillRef idx="0">
-              <a:schemeClr val="accent1"/>
-            </a:fillRef>
-            <a:effectRef idx="0">
-              <a:schemeClr val="accent1"/>
-            </a:effectRef>
-            <a:fontRef idx="minor">
-              <a:schemeClr val="tx1"/>
-            </a:fontRef>
-          </p:style>
-          <p:txBody>
-            <a:bodyPr rtlCol="0" anchor="ctr"/>
-            <a:lstStyle/>
-            <a:p>
-              <a:pPr algn="ctr"/>
-              <a:endParaRPr lang="en-GB"/>
-            </a:p>
-          </p:txBody>
-        </p:sp>
-        <p:sp>
-          <p:nvSpPr>
-            <p:cNvPr id="24" name="Arc 23">
-              <a:extLst>
-                <a:ext uri="{FF2B5EF4-FFF2-40B4-BE49-F238E27FC236}">
-                  <a16:creationId xmlns:a16="http://schemas.microsoft.com/office/drawing/2014/main" id="{466D60E7-1C05-4ECB-862B-26F32975CF90}"/>
-                </a:ext>
-              </a:extLst>
-            </p:cNvPr>
-            <p:cNvSpPr/>
-            <p:nvPr/>
-          </p:nvSpPr>
-          <p:spPr>
-            <a:xfrm rot="8208340">
-              <a:off x="1681965" y="2847573"/>
-              <a:ext cx="292420" cy="297865"/>
-            </a:xfrm>
-            <a:prstGeom prst="arc">
-              <a:avLst/>
-            </a:prstGeom>
-            <a:ln w="28575">
-              <a:solidFill>
-                <a:schemeClr val="tx1">
-                  <a:lumMod val="65000"/>
-                  <a:lumOff val="35000"/>
-                </a:schemeClr>
-              </a:solidFill>
-            </a:ln>
-          </p:spPr>
-          <p:style>
-            <a:lnRef idx="1">
-              <a:schemeClr val="accent1"/>
-            </a:lnRef>
-            <a:fillRef idx="0">
-              <a:schemeClr val="accent1"/>
-            </a:fillRef>
-            <a:effectRef idx="0">
-              <a:schemeClr val="accent1"/>
-            </a:effectRef>
-            <a:fontRef idx="minor">
-              <a:schemeClr val="tx1"/>
-            </a:fontRef>
-          </p:style>
-          <p:txBody>
-            <a:bodyPr rtlCol="0" anchor="ctr"/>
-            <a:lstStyle/>
-            <a:p>
-              <a:pPr algn="ctr"/>
-              <a:endParaRPr lang="en-GB"/>
-            </a:p>
-          </p:txBody>
-        </p:sp>
-      </p:grpSp>
+            </a:solidFill>
+          </a:ln>
+        </p:spPr>
+        <p:style>
+          <a:lnRef idx="2">
+            <a:schemeClr val="accent1">
+              <a:shade val="50000"/>
+            </a:schemeClr>
+          </a:lnRef>
+          <a:fillRef idx="1">
+            <a:schemeClr val="accent1"/>
+          </a:fillRef>
+          <a:effectRef idx="0">
+            <a:schemeClr val="accent1"/>
+          </a:effectRef>
+          <a:fontRef idx="minor">
+            <a:schemeClr val="lt1"/>
+          </a:fontRef>
+        </p:style>
+        <p:txBody>
+          <a:bodyPr rtlCol="0" anchor="ctr"/>
+          <a:lstStyle/>
+          <a:p>
+            <a:pPr algn="ctr"/>
+            <a:endParaRPr lang="en-GB" dirty="0"/>
+          </a:p>
+        </p:txBody>
+      </p:sp>
+      <p:sp>
+        <p:nvSpPr>
+          <p:cNvPr id="22" name="Freeform: Shape 21">
+            <a:extLst>
+              <a:ext uri="{FF2B5EF4-FFF2-40B4-BE49-F238E27FC236}">
+                <a16:creationId xmlns:a16="http://schemas.microsoft.com/office/drawing/2014/main" id="{97337FE2-0F17-4E81-90C4-DA3E53232EBD}"/>
+              </a:ext>
+            </a:extLst>
+          </p:cNvPr>
+          <p:cNvSpPr/>
+          <p:nvPr/>
+        </p:nvSpPr>
+        <p:spPr>
+          <a:xfrm rot="8762289">
+            <a:off x="1390805" y="4451208"/>
+            <a:ext cx="1244215" cy="1018574"/>
+          </a:xfrm>
+          <a:custGeom>
+            <a:avLst/>
+            <a:gdLst>
+              <a:gd name="connsiteX0" fmla="*/ 329155 w 627002"/>
+              <a:gd name="connsiteY0" fmla="*/ 0 h 411255"/>
+              <a:gd name="connsiteX1" fmla="*/ 624430 w 627002"/>
+              <a:gd name="connsiteY1" fmla="*/ 266700 h 411255"/>
+              <a:gd name="connsiteX2" fmla="*/ 448217 w 627002"/>
+              <a:gd name="connsiteY2" fmla="*/ 407194 h 411255"/>
+              <a:gd name="connsiteX3" fmla="*/ 38642 w 627002"/>
+              <a:gd name="connsiteY3" fmla="*/ 376238 h 411255"/>
+              <a:gd name="connsiteX4" fmla="*/ 41023 w 627002"/>
+              <a:gd name="connsiteY4" fmla="*/ 373857 h 411255"/>
+            </a:gdLst>
+            <a:ahLst/>
+            <a:cxnLst>
+              <a:cxn ang="0">
+                <a:pos x="connsiteX0" y="connsiteY0"/>
+              </a:cxn>
+              <a:cxn ang="0">
+                <a:pos x="connsiteX1" y="connsiteY1"/>
+              </a:cxn>
+              <a:cxn ang="0">
+                <a:pos x="connsiteX2" y="connsiteY2"/>
+              </a:cxn>
+              <a:cxn ang="0">
+                <a:pos x="connsiteX3" y="connsiteY3"/>
+              </a:cxn>
+              <a:cxn ang="0">
+                <a:pos x="connsiteX4" y="connsiteY4"/>
+              </a:cxn>
+            </a:cxnLst>
+            <a:rect l="l" t="t" r="r" b="b"/>
+            <a:pathLst>
+              <a:path w="627002" h="411255">
+                <a:moveTo>
+                  <a:pt x="329155" y="0"/>
+                </a:moveTo>
+                <a:cubicBezTo>
+                  <a:pt x="466870" y="99417"/>
+                  <a:pt x="604586" y="198834"/>
+                  <a:pt x="624430" y="266700"/>
+                </a:cubicBezTo>
+                <a:cubicBezTo>
+                  <a:pt x="644274" y="334566"/>
+                  <a:pt x="545848" y="388938"/>
+                  <a:pt x="448217" y="407194"/>
+                </a:cubicBezTo>
+                <a:cubicBezTo>
+                  <a:pt x="350586" y="425450"/>
+                  <a:pt x="38642" y="376238"/>
+                  <a:pt x="38642" y="376238"/>
+                </a:cubicBezTo>
+                <a:cubicBezTo>
+                  <a:pt x="-29224" y="370682"/>
+                  <a:pt x="5899" y="372269"/>
+                  <a:pt x="41023" y="373857"/>
+                </a:cubicBezTo>
+              </a:path>
+            </a:pathLst>
+          </a:custGeom>
+          <a:noFill/>
+          <a:ln w="28575">
+            <a:solidFill>
+              <a:schemeClr val="tx1">
+                <a:lumMod val="65000"/>
+                <a:lumOff val="35000"/>
+              </a:schemeClr>
+            </a:solidFill>
+          </a:ln>
+        </p:spPr>
+        <p:style>
+          <a:lnRef idx="2">
+            <a:schemeClr val="accent1">
+              <a:shade val="50000"/>
+            </a:schemeClr>
+          </a:lnRef>
+          <a:fillRef idx="1">
+            <a:schemeClr val="accent1"/>
+          </a:fillRef>
+          <a:effectRef idx="0">
+            <a:schemeClr val="accent1"/>
+          </a:effectRef>
+          <a:fontRef idx="minor">
+            <a:schemeClr val="lt1"/>
+          </a:fontRef>
+        </p:style>
+        <p:txBody>
+          <a:bodyPr rtlCol="0" anchor="ctr"/>
+          <a:lstStyle/>
+          <a:p>
+            <a:pPr algn="ctr"/>
+            <a:endParaRPr lang="en-GB"/>
+          </a:p>
+        </p:txBody>
+      </p:sp>
+      <p:sp>
+        <p:nvSpPr>
+          <p:cNvPr id="5" name="Freeform: Shape 4">
+            <a:extLst>
+              <a:ext uri="{FF2B5EF4-FFF2-40B4-BE49-F238E27FC236}">
+                <a16:creationId xmlns:a16="http://schemas.microsoft.com/office/drawing/2014/main" id="{6D85E96A-3B46-421B-BADA-FEC538A31278}"/>
+              </a:ext>
+            </a:extLst>
+          </p:cNvPr>
+          <p:cNvSpPr/>
+          <p:nvPr/>
+        </p:nvSpPr>
+        <p:spPr>
+          <a:xfrm>
+            <a:off x="776213" y="3730248"/>
+            <a:ext cx="1244215" cy="1018574"/>
+          </a:xfrm>
+          <a:custGeom>
+            <a:avLst/>
+            <a:gdLst>
+              <a:gd name="connsiteX0" fmla="*/ 329155 w 627002"/>
+              <a:gd name="connsiteY0" fmla="*/ 0 h 411255"/>
+              <a:gd name="connsiteX1" fmla="*/ 624430 w 627002"/>
+              <a:gd name="connsiteY1" fmla="*/ 266700 h 411255"/>
+              <a:gd name="connsiteX2" fmla="*/ 448217 w 627002"/>
+              <a:gd name="connsiteY2" fmla="*/ 407194 h 411255"/>
+              <a:gd name="connsiteX3" fmla="*/ 38642 w 627002"/>
+              <a:gd name="connsiteY3" fmla="*/ 376238 h 411255"/>
+              <a:gd name="connsiteX4" fmla="*/ 41023 w 627002"/>
+              <a:gd name="connsiteY4" fmla="*/ 373857 h 411255"/>
+            </a:gdLst>
+            <a:ahLst/>
+            <a:cxnLst>
+              <a:cxn ang="0">
+                <a:pos x="connsiteX0" y="connsiteY0"/>
+              </a:cxn>
+              <a:cxn ang="0">
+                <a:pos x="connsiteX1" y="connsiteY1"/>
+              </a:cxn>
+              <a:cxn ang="0">
+                <a:pos x="connsiteX2" y="connsiteY2"/>
+              </a:cxn>
+              <a:cxn ang="0">
+                <a:pos x="connsiteX3" y="connsiteY3"/>
+              </a:cxn>
+              <a:cxn ang="0">
+                <a:pos x="connsiteX4" y="connsiteY4"/>
+              </a:cxn>
+            </a:cxnLst>
+            <a:rect l="l" t="t" r="r" b="b"/>
+            <a:pathLst>
+              <a:path w="627002" h="411255">
+                <a:moveTo>
+                  <a:pt x="329155" y="0"/>
+                </a:moveTo>
+                <a:cubicBezTo>
+                  <a:pt x="466870" y="99417"/>
+                  <a:pt x="604586" y="198834"/>
+                  <a:pt x="624430" y="266700"/>
+                </a:cubicBezTo>
+                <a:cubicBezTo>
+                  <a:pt x="644274" y="334566"/>
+                  <a:pt x="545848" y="388938"/>
+                  <a:pt x="448217" y="407194"/>
+                </a:cubicBezTo>
+                <a:cubicBezTo>
+                  <a:pt x="350586" y="425450"/>
+                  <a:pt x="38642" y="376238"/>
+                  <a:pt x="38642" y="376238"/>
+                </a:cubicBezTo>
+                <a:cubicBezTo>
+                  <a:pt x="-29224" y="370682"/>
+                  <a:pt x="5899" y="372269"/>
+                  <a:pt x="41023" y="373857"/>
+                </a:cubicBezTo>
+              </a:path>
+            </a:pathLst>
+          </a:custGeom>
+          <a:solidFill>
+            <a:schemeClr val="accent1">
+              <a:lumMod val="40000"/>
+              <a:lumOff val="60000"/>
+            </a:schemeClr>
+          </a:solidFill>
+          <a:ln w="28575">
+            <a:solidFill>
+              <a:schemeClr val="tx1">
+                <a:lumMod val="65000"/>
+                <a:lumOff val="35000"/>
+              </a:schemeClr>
+            </a:solidFill>
+          </a:ln>
+        </p:spPr>
+        <p:style>
+          <a:lnRef idx="2">
+            <a:schemeClr val="accent1">
+              <a:shade val="50000"/>
+            </a:schemeClr>
+          </a:lnRef>
+          <a:fillRef idx="1">
+            <a:schemeClr val="accent1"/>
+          </a:fillRef>
+          <a:effectRef idx="0">
+            <a:schemeClr val="accent1"/>
+          </a:effectRef>
+          <a:fontRef idx="minor">
+            <a:schemeClr val="lt1"/>
+          </a:fontRef>
+        </p:style>
+        <p:txBody>
+          <a:bodyPr rtlCol="0" anchor="ctr"/>
+          <a:lstStyle/>
+          <a:p>
+            <a:pPr algn="ctr"/>
+            <a:endParaRPr lang="en-GB"/>
+          </a:p>
+        </p:txBody>
+      </p:sp>
+      <p:sp>
+        <p:nvSpPr>
+          <p:cNvPr id="23" name="Arc 22">
+            <a:extLst>
+              <a:ext uri="{FF2B5EF4-FFF2-40B4-BE49-F238E27FC236}">
+                <a16:creationId xmlns:a16="http://schemas.microsoft.com/office/drawing/2014/main" id="{4D817DBB-903E-4EBB-A2A5-E895FF8220F7}"/>
+              </a:ext>
+            </a:extLst>
+          </p:cNvPr>
+          <p:cNvSpPr/>
+          <p:nvPr/>
+        </p:nvSpPr>
+        <p:spPr>
+          <a:xfrm rot="8208340">
+            <a:off x="1137790" y="2854205"/>
+            <a:ext cx="292420" cy="297865"/>
+          </a:xfrm>
+          <a:prstGeom prst="arc">
+            <a:avLst/>
+          </a:prstGeom>
+          <a:ln w="28575">
+            <a:solidFill>
+              <a:schemeClr val="tx1">
+                <a:lumMod val="65000"/>
+                <a:lumOff val="35000"/>
+              </a:schemeClr>
+            </a:solidFill>
+          </a:ln>
+        </p:spPr>
+        <p:style>
+          <a:lnRef idx="1">
+            <a:schemeClr val="accent1"/>
+          </a:lnRef>
+          <a:fillRef idx="0">
+            <a:schemeClr val="accent1"/>
+          </a:fillRef>
+          <a:effectRef idx="0">
+            <a:schemeClr val="accent1"/>
+          </a:effectRef>
+          <a:fontRef idx="minor">
+            <a:schemeClr val="tx1"/>
+          </a:fontRef>
+        </p:style>
+        <p:txBody>
+          <a:bodyPr rtlCol="0" anchor="ctr"/>
+          <a:lstStyle/>
+          <a:p>
+            <a:pPr algn="ctr"/>
+            <a:endParaRPr lang="en-GB"/>
+          </a:p>
+        </p:txBody>
+      </p:sp>
+      <p:sp>
+        <p:nvSpPr>
+          <p:cNvPr id="24" name="Arc 23">
+            <a:extLst>
+              <a:ext uri="{FF2B5EF4-FFF2-40B4-BE49-F238E27FC236}">
+                <a16:creationId xmlns:a16="http://schemas.microsoft.com/office/drawing/2014/main" id="{466D60E7-1C05-4ECB-862B-26F32975CF90}"/>
+              </a:ext>
+            </a:extLst>
+          </p:cNvPr>
+          <p:cNvSpPr/>
+          <p:nvPr/>
+        </p:nvSpPr>
+        <p:spPr>
+          <a:xfrm rot="8208340">
+            <a:off x="1681965" y="2847573"/>
+            <a:ext cx="292420" cy="297865"/>
+          </a:xfrm>
+          <a:prstGeom prst="arc">
+            <a:avLst/>
+          </a:prstGeom>
+          <a:ln w="28575">
+            <a:solidFill>
+              <a:schemeClr val="tx1">
+                <a:lumMod val="65000"/>
+                <a:lumOff val="35000"/>
+              </a:schemeClr>
+            </a:solidFill>
+          </a:ln>
+        </p:spPr>
+        <p:style>
+          <a:lnRef idx="1">
+            <a:schemeClr val="accent1"/>
+          </a:lnRef>
+          <a:fillRef idx="0">
+            <a:schemeClr val="accent1"/>
+          </a:fillRef>
+          <a:effectRef idx="0">
+            <a:schemeClr val="accent1"/>
+          </a:effectRef>
+          <a:fontRef idx="minor">
+            <a:schemeClr val="tx1"/>
+          </a:fontRef>
+        </p:style>
+        <p:txBody>
+          <a:bodyPr rtlCol="0" anchor="ctr"/>
+          <a:lstStyle/>
+          <a:p>
+            <a:pPr algn="ctr"/>
+            <a:endParaRPr lang="en-GB"/>
+          </a:p>
+        </p:txBody>
+      </p:sp>
     </p:spTree>
     <p:extLst>
       <p:ext uri="{BB962C8B-B14F-4D97-AF65-F5344CB8AC3E}">

</xml_diff>